<commit_message>
Update slides from Dec 2017 meeting
</commit_message>
<xml_diff>
--- a/slides/2017-12-05-Catastrophic-Errors.pptx
+++ b/slides/2017-12-05-Catastrophic-Errors.pptx
@@ -10,8 +10,8 @@
     <p:sldId id="257" r:id="rId4"/>
     <p:sldId id="258" r:id="rId5"/>
     <p:sldId id="259" r:id="rId6"/>
-    <p:sldId id="261" r:id="rId7"/>
-    <p:sldId id="260" r:id="rId8"/>
+    <p:sldId id="260" r:id="rId7"/>
+    <p:sldId id="261" r:id="rId8"/>
     <p:sldId id="262" r:id="rId9"/>
     <p:sldId id="263" r:id="rId10"/>
     <p:sldId id="264" r:id="rId11"/>
@@ -252,7 +252,7 @@
           <a:p>
             <a:fld id="{C440B3EA-A8D2-EF4F-8CAC-E9AA01D7482B}" type="datetimeFigureOut">
               <a:rPr lang="en-US" smtClean="0"/>
-              <a:t>11/28/17</a:t>
+              <a:t>11/29/17</a:t>
             </a:fld>
             <a:endParaRPr lang="en-US"/>
           </a:p>
@@ -417,7 +417,7 @@
           <a:p>
             <a:fld id="{C440B3EA-A8D2-EF4F-8CAC-E9AA01D7482B}" type="datetimeFigureOut">
               <a:rPr lang="en-US" smtClean="0"/>
-              <a:t>11/28/17</a:t>
+              <a:t>11/29/17</a:t>
             </a:fld>
             <a:endParaRPr lang="en-US"/>
           </a:p>
@@ -592,7 +592,7 @@
           <a:p>
             <a:fld id="{C440B3EA-A8D2-EF4F-8CAC-E9AA01D7482B}" type="datetimeFigureOut">
               <a:rPr lang="en-US" smtClean="0"/>
-              <a:t>11/28/17</a:t>
+              <a:t>11/29/17</a:t>
             </a:fld>
             <a:endParaRPr lang="en-US"/>
           </a:p>
@@ -779,7 +779,7 @@
           <a:p>
             <a:fld id="{C440B3EA-A8D2-EF4F-8CAC-E9AA01D7482B}" type="datetimeFigureOut">
               <a:rPr lang="en-US" smtClean="0"/>
-              <a:t>11/28/17</a:t>
+              <a:t>11/29/17</a:t>
             </a:fld>
             <a:endParaRPr lang="en-US"/>
           </a:p>
@@ -944,7 +944,7 @@
           <a:p>
             <a:fld id="{C440B3EA-A8D2-EF4F-8CAC-E9AA01D7482B}" type="datetimeFigureOut">
               <a:rPr lang="en-US" smtClean="0"/>
-              <a:t>11/28/17</a:t>
+              <a:t>11/29/17</a:t>
             </a:fld>
             <a:endParaRPr lang="en-US"/>
           </a:p>
@@ -1185,7 +1185,7 @@
           <a:p>
             <a:fld id="{C440B3EA-A8D2-EF4F-8CAC-E9AA01D7482B}" type="datetimeFigureOut">
               <a:rPr lang="en-US" smtClean="0"/>
-              <a:t>11/28/17</a:t>
+              <a:t>11/29/17</a:t>
             </a:fld>
             <a:endParaRPr lang="en-US"/>
           </a:p>
@@ -1412,7 +1412,7 @@
           <a:p>
             <a:fld id="{C440B3EA-A8D2-EF4F-8CAC-E9AA01D7482B}" type="datetimeFigureOut">
               <a:rPr lang="en-US" smtClean="0"/>
-              <a:t>11/28/17</a:t>
+              <a:t>11/29/17</a:t>
             </a:fld>
             <a:endParaRPr lang="en-US"/>
           </a:p>
@@ -1774,7 +1774,7 @@
           <a:p>
             <a:fld id="{C440B3EA-A8D2-EF4F-8CAC-E9AA01D7482B}" type="datetimeFigureOut">
               <a:rPr lang="en-US" smtClean="0"/>
-              <a:t>11/28/17</a:t>
+              <a:t>11/29/17</a:t>
             </a:fld>
             <a:endParaRPr lang="en-US"/>
           </a:p>
@@ -1887,7 +1887,7 @@
           <a:p>
             <a:fld id="{C440B3EA-A8D2-EF4F-8CAC-E9AA01D7482B}" type="datetimeFigureOut">
               <a:rPr lang="en-US" smtClean="0"/>
-              <a:t>11/28/17</a:t>
+              <a:t>11/29/17</a:t>
             </a:fld>
             <a:endParaRPr lang="en-US"/>
           </a:p>
@@ -1977,7 +1977,7 @@
           <a:p>
             <a:fld id="{C440B3EA-A8D2-EF4F-8CAC-E9AA01D7482B}" type="datetimeFigureOut">
               <a:rPr lang="en-US" smtClean="0"/>
-              <a:t>11/28/17</a:t>
+              <a:t>11/29/17</a:t>
             </a:fld>
             <a:endParaRPr lang="en-US"/>
           </a:p>
@@ -2249,7 +2249,7 @@
           <a:p>
             <a:fld id="{C440B3EA-A8D2-EF4F-8CAC-E9AA01D7482B}" type="datetimeFigureOut">
               <a:rPr lang="en-US" smtClean="0"/>
-              <a:t>11/28/17</a:t>
+              <a:t>11/29/17</a:t>
             </a:fld>
             <a:endParaRPr lang="en-US"/>
           </a:p>
@@ -2414,7 +2414,7 @@
           <a:p>
             <a:fld id="{C440B3EA-A8D2-EF4F-8CAC-E9AA01D7482B}" type="datetimeFigureOut">
               <a:rPr lang="en-US" smtClean="0"/>
-              <a:t>11/28/17</a:t>
+              <a:t>11/29/17</a:t>
             </a:fld>
             <a:endParaRPr lang="en-US"/>
           </a:p>
@@ -2666,7 +2666,7 @@
           <a:p>
             <a:fld id="{C440B3EA-A8D2-EF4F-8CAC-E9AA01D7482B}" type="datetimeFigureOut">
               <a:rPr lang="en-US" smtClean="0"/>
-              <a:t>11/28/17</a:t>
+              <a:t>11/29/17</a:t>
             </a:fld>
             <a:endParaRPr lang="en-US"/>
           </a:p>
@@ -2831,7 +2831,7 @@
           <a:p>
             <a:fld id="{C440B3EA-A8D2-EF4F-8CAC-E9AA01D7482B}" type="datetimeFigureOut">
               <a:rPr lang="en-US" smtClean="0"/>
-              <a:t>11/28/17</a:t>
+              <a:t>11/29/17</a:t>
             </a:fld>
             <a:endParaRPr lang="en-US"/>
           </a:p>
@@ -3006,7 +3006,7 @@
           <a:p>
             <a:fld id="{C440B3EA-A8D2-EF4F-8CAC-E9AA01D7482B}" type="datetimeFigureOut">
               <a:rPr lang="en-US" smtClean="0"/>
-              <a:t>11/28/17</a:t>
+              <a:t>11/29/17</a:t>
             </a:fld>
             <a:endParaRPr lang="en-US"/>
           </a:p>
@@ -3247,7 +3247,7 @@
           <a:p>
             <a:fld id="{C440B3EA-A8D2-EF4F-8CAC-E9AA01D7482B}" type="datetimeFigureOut">
               <a:rPr lang="en-US" smtClean="0"/>
-              <a:t>11/28/17</a:t>
+              <a:t>11/29/17</a:t>
             </a:fld>
             <a:endParaRPr lang="en-US"/>
           </a:p>
@@ -3474,7 +3474,7 @@
           <a:p>
             <a:fld id="{C440B3EA-A8D2-EF4F-8CAC-E9AA01D7482B}" type="datetimeFigureOut">
               <a:rPr lang="en-US" smtClean="0"/>
-              <a:t>11/28/17</a:t>
+              <a:t>11/29/17</a:t>
             </a:fld>
             <a:endParaRPr lang="en-US"/>
           </a:p>
@@ -3836,7 +3836,7 @@
           <a:p>
             <a:fld id="{C440B3EA-A8D2-EF4F-8CAC-E9AA01D7482B}" type="datetimeFigureOut">
               <a:rPr lang="en-US" smtClean="0"/>
-              <a:t>11/28/17</a:t>
+              <a:t>11/29/17</a:t>
             </a:fld>
             <a:endParaRPr lang="en-US"/>
           </a:p>
@@ -3949,7 +3949,7 @@
           <a:p>
             <a:fld id="{C440B3EA-A8D2-EF4F-8CAC-E9AA01D7482B}" type="datetimeFigureOut">
               <a:rPr lang="en-US" smtClean="0"/>
-              <a:t>11/28/17</a:t>
+              <a:t>11/29/17</a:t>
             </a:fld>
             <a:endParaRPr lang="en-US"/>
           </a:p>
@@ -4039,7 +4039,7 @@
           <a:p>
             <a:fld id="{C440B3EA-A8D2-EF4F-8CAC-E9AA01D7482B}" type="datetimeFigureOut">
               <a:rPr lang="en-US" smtClean="0"/>
-              <a:t>11/28/17</a:t>
+              <a:t>11/29/17</a:t>
             </a:fld>
             <a:endParaRPr lang="en-US"/>
           </a:p>
@@ -4311,7 +4311,7 @@
           <a:p>
             <a:fld id="{C440B3EA-A8D2-EF4F-8CAC-E9AA01D7482B}" type="datetimeFigureOut">
               <a:rPr lang="en-US" smtClean="0"/>
-              <a:t>11/28/17</a:t>
+              <a:t>11/29/17</a:t>
             </a:fld>
             <a:endParaRPr lang="en-US"/>
           </a:p>
@@ -4563,7 +4563,7 @@
           <a:p>
             <a:fld id="{C440B3EA-A8D2-EF4F-8CAC-E9AA01D7482B}" type="datetimeFigureOut">
               <a:rPr lang="en-US" smtClean="0"/>
-              <a:t>11/28/17</a:t>
+              <a:t>11/29/17</a:t>
             </a:fld>
             <a:endParaRPr lang="en-US"/>
           </a:p>
@@ -4771,7 +4771,7 @@
           <a:p>
             <a:fld id="{C440B3EA-A8D2-EF4F-8CAC-E9AA01D7482B}" type="datetimeFigureOut">
               <a:rPr lang="en-US" smtClean="0"/>
-              <a:t>11/28/17</a:t>
+              <a:t>11/29/17</a:t>
             </a:fld>
             <a:endParaRPr lang="en-US"/>
           </a:p>
@@ -5311,7 +5311,7 @@
           <a:p>
             <a:fld id="{C440B3EA-A8D2-EF4F-8CAC-E9AA01D7482B}" type="datetimeFigureOut">
               <a:rPr lang="en-US" smtClean="0"/>
-              <a:t>11/28/17</a:t>
+              <a:t>11/29/17</a:t>
             </a:fld>
             <a:endParaRPr lang="en-US"/>
           </a:p>
@@ -5764,7 +5764,6 @@
               <a:rPr lang="en-US" dirty="0"/>
               <a:t>December 2017 MPI Forum F2F</a:t>
             </a:r>
-            <a:endParaRPr lang="en-US" dirty="0"/>
           </a:p>
         </p:txBody>
       </p:sp>
@@ -5963,7 +5962,7 @@
         <p:spPr/>
         <p:txBody>
           <a:bodyPr>
-            <a:normAutofit fontScale="92500" lnSpcReduction="20000"/>
+            <a:normAutofit fontScale="85000" lnSpcReduction="10000"/>
           </a:bodyPr>
           <a:lstStyle/>
           <a:p>
@@ -6010,8 +6009,20 @@
             <a:pPr lvl="1"/>
             <a:r>
               <a:rPr lang="en-US" dirty="0" smtClean="0"/>
-              <a:t>Something like EAGAIN</a:t>
-            </a:r>
+              <a:t>Something like </a:t>
+            </a:r>
+            <a:r>
+              <a:rPr lang="en-US" dirty="0" smtClean="0"/>
+              <a:t>EAGAIN</a:t>
+            </a:r>
+          </a:p>
+          <a:p>
+            <a:pPr lvl="1"/>
+            <a:r>
+              <a:rPr lang="en-US" dirty="0" smtClean="0"/>
+              <a:t>Give performance hints to users (posting a certain receive would lose hardware matching)</a:t>
+            </a:r>
+            <a:endParaRPr lang="en-US" dirty="0" smtClean="0"/>
           </a:p>
           <a:p>
             <a:r>
@@ -6165,7 +6176,7 @@
           <a:p>
             <a:r>
               <a:rPr lang="en-US" dirty="0" smtClean="0"/>
-              <a:t>What other options did we look at?</a:t>
+              <a:t>Solution</a:t>
             </a:r>
             <a:endParaRPr lang="en-US" dirty="0"/>
           </a:p>
@@ -6183,51 +6194,128 @@
         </p:nvSpPr>
         <p:spPr/>
         <p:txBody>
-          <a:bodyPr/>
-          <a:lstStyle/>
-          <a:p>
+          <a:bodyPr>
+            <a:normAutofit lnSpcReduction="10000"/>
+          </a:bodyPr>
+          <a:lstStyle/>
+          <a:p>
+            <a:pPr marL="0" indent="0">
+              <a:buNone/>
+            </a:pPr>
+            <a:r>
+              <a:rPr lang="en-US" dirty="0" err="1" smtClean="0">
+                <a:latin typeface="Menlo" charset="0"/>
+                <a:ea typeface="Menlo" charset="0"/>
+                <a:cs typeface="Menlo" charset="0"/>
+              </a:rPr>
+              <a:t>int</a:t>
+            </a:r>
+            <a:r>
+              <a:rPr lang="en-US" dirty="0" smtClean="0">
+                <a:latin typeface="Menlo" charset="0"/>
+                <a:ea typeface="Menlo" charset="0"/>
+                <a:cs typeface="Menlo" charset="0"/>
+              </a:rPr>
+              <a:t> MPI_GET_STATE(</a:t>
+            </a:r>
+            <a:r>
+              <a:rPr lang="en-US" dirty="0" err="1" smtClean="0">
+                <a:latin typeface="Menlo" charset="0"/>
+                <a:ea typeface="Menlo" charset="0"/>
+                <a:cs typeface="Menlo" charset="0"/>
+              </a:rPr>
+              <a:t>int</a:t>
+            </a:r>
+            <a:r>
+              <a:rPr lang="en-US" dirty="0" smtClean="0">
+                <a:latin typeface="Menlo" charset="0"/>
+                <a:ea typeface="Menlo" charset="0"/>
+                <a:cs typeface="Menlo" charset="0"/>
+              </a:rPr>
+              <a:t> *state);</a:t>
+            </a:r>
+          </a:p>
+          <a:p>
+            <a:pPr marL="0" indent="0">
+              <a:buNone/>
+            </a:pPr>
+            <a:endParaRPr lang="en-US" dirty="0" smtClean="0">
+              <a:latin typeface="Menlo" charset="0"/>
+              <a:ea typeface="Menlo" charset="0"/>
+              <a:cs typeface="Menlo" charset="0"/>
+            </a:endParaRPr>
+          </a:p>
+          <a:p>
+            <a:r>
+              <a:rPr lang="en-US" dirty="0" smtClean="0">
+                <a:latin typeface="Menlo" charset="0"/>
+                <a:ea typeface="Menlo" charset="0"/>
+                <a:cs typeface="Menlo" charset="0"/>
+              </a:rPr>
+              <a:t>state</a:t>
+            </a:r>
             <a:r>
               <a:rPr lang="en-US" dirty="0" smtClean="0"/>
-              <a:t>Embed a catastrophic in the error code</a:t>
+              <a:t> is a well-defined (enumerated) list of constants to describe the state of the entire library.</a:t>
             </a:r>
           </a:p>
           <a:p>
             <a:pPr lvl="1"/>
             <a:r>
+              <a:rPr lang="en-US" dirty="0" smtClean="0">
+                <a:latin typeface="Menlo" charset="0"/>
+                <a:ea typeface="Menlo" charset="0"/>
+                <a:cs typeface="Menlo" charset="0"/>
+              </a:rPr>
+              <a:t>MPI_IS_OK</a:t>
+            </a:r>
+          </a:p>
+          <a:p>
+            <a:pPr lvl="1"/>
+            <a:r>
+              <a:rPr lang="en-US" dirty="0" smtClean="0">
+                <a:latin typeface="Menlo" charset="0"/>
+                <a:ea typeface="Menlo" charset="0"/>
+                <a:cs typeface="Menlo" charset="0"/>
+              </a:rPr>
+              <a:t>MPI_IS_CATASTROPHIC</a:t>
+            </a:r>
+          </a:p>
+          <a:p>
+            <a:r>
               <a:rPr lang="en-US" dirty="0" smtClean="0"/>
-              <a:t>It doesn’t help with thread safety (because thread safety doesn’t apply if the library is catastrophic)</a:t>
+              <a:t>Tweak the wording about MPI being undefined after errors to say that it’s only undefined after catastrophic errors.</a:t>
+            </a:r>
+            <a:endParaRPr lang="en-US" dirty="0"/>
+          </a:p>
+          <a:p>
+            <a:r>
+              <a:rPr lang="en-US" dirty="0" smtClean="0"/>
+              <a:t>You can read the issue </a:t>
+            </a:r>
+            <a:r>
+              <a:rPr lang="en-US" dirty="0" smtClean="0">
+                <a:hlinkClick r:id="rId2"/>
+              </a:rPr>
+              <a:t>mpi-forum/mpi-issues#28</a:t>
+            </a:r>
+            <a:r>
+              <a:rPr lang="en-US" dirty="0" smtClean="0"/>
+              <a:t> and pull request </a:t>
+            </a:r>
+            <a:r>
+              <a:rPr lang="en-US" dirty="0" smtClean="0">
+                <a:hlinkClick r:id="rId3"/>
+              </a:rPr>
+              <a:t>mpi-forum/mpi-standard#9</a:t>
+            </a:r>
+            <a:r>
+              <a:rPr lang="en-US" dirty="0" smtClean="0"/>
+              <a:t>.</a:t>
             </a:r>
           </a:p>
           <a:p>
             <a:pPr lvl="1"/>
-            <a:r>
-              <a:rPr lang="en-US" dirty="0" smtClean="0"/>
-              <a:t>You might have an error that occurs in somewhere that doesn’t have an error code (e.g. another thread, “completed” send, incoming fragment causes error)</a:t>
-            </a:r>
-          </a:p>
-          <a:p>
-            <a:r>
-              <a:rPr lang="en-US" dirty="0" smtClean="0"/>
-              <a:t>Have catastrophic classes and non-catastrophic classes</a:t>
-            </a:r>
-          </a:p>
-          <a:p>
-            <a:pPr lvl="1"/>
-            <a:r>
-              <a:rPr lang="en-US" dirty="0" smtClean="0"/>
-              <a:t>Some errors might be catastrophic at times and non-catastrophic at other times</a:t>
-            </a:r>
-          </a:p>
-          <a:p>
-            <a:pPr lvl="1"/>
-            <a:r>
-              <a:rPr lang="en-US" dirty="0" smtClean="0"/>
-              <a:t>Also, it’s harder to determine </a:t>
-            </a:r>
-            <a:r>
-              <a:rPr lang="en-US" dirty="0" smtClean="0"/>
-              <a:t>programmatically</a:t>
-            </a:r>
             <a:endParaRPr lang="en-US" dirty="0"/>
           </a:p>
         </p:txBody>
@@ -6235,13 +6323,20 @@
     </p:spTree>
     <p:extLst>
       <p:ext uri="{BB962C8B-B14F-4D97-AF65-F5344CB8AC3E}">
-        <p14:creationId xmlns:p14="http://schemas.microsoft.com/office/powerpoint/2010/main" val="1557670211"/>
+        <p14:creationId xmlns:p14="http://schemas.microsoft.com/office/powerpoint/2010/main" val="1479762370"/>
       </p:ext>
     </p:extLst>
   </p:cSld>
   <p:clrMapOvr>
     <a:masterClrMapping/>
   </p:clrMapOvr>
+  <p:timing>
+    <p:tnLst>
+      <p:par>
+        <p:cTn id="1" dur="indefinite" restart="never" nodeType="tmRoot"/>
+      </p:par>
+    </p:tnLst>
+  </p:timing>
 </p:sld>
 </file>
 
@@ -6279,7 +6374,7 @@
           <a:p>
             <a:r>
               <a:rPr lang="en-US" dirty="0" smtClean="0"/>
-              <a:t>Solution</a:t>
+              <a:t>What other options did we look at?</a:t>
             </a:r>
             <a:endParaRPr lang="en-US" dirty="0"/>
           </a:p>
@@ -6297,128 +6392,47 @@
         </p:nvSpPr>
         <p:spPr/>
         <p:txBody>
-          <a:bodyPr>
-            <a:normAutofit lnSpcReduction="10000"/>
-          </a:bodyPr>
-          <a:lstStyle/>
-          <a:p>
-            <a:pPr marL="0" indent="0">
-              <a:buNone/>
-            </a:pPr>
-            <a:r>
-              <a:rPr lang="en-US" dirty="0" err="1" smtClean="0">
-                <a:latin typeface="Menlo" charset="0"/>
-                <a:ea typeface="Menlo" charset="0"/>
-                <a:cs typeface="Menlo" charset="0"/>
-              </a:rPr>
-              <a:t>int</a:t>
-            </a:r>
-            <a:r>
-              <a:rPr lang="en-US" dirty="0" smtClean="0">
-                <a:latin typeface="Menlo" charset="0"/>
-                <a:ea typeface="Menlo" charset="0"/>
-                <a:cs typeface="Menlo" charset="0"/>
-              </a:rPr>
-              <a:t> MPI_GET_STATE(</a:t>
-            </a:r>
-            <a:r>
-              <a:rPr lang="en-US" dirty="0" err="1" smtClean="0">
-                <a:latin typeface="Menlo" charset="0"/>
-                <a:ea typeface="Menlo" charset="0"/>
-                <a:cs typeface="Menlo" charset="0"/>
-              </a:rPr>
-              <a:t>int</a:t>
-            </a:r>
-            <a:r>
-              <a:rPr lang="en-US" dirty="0" smtClean="0">
-                <a:latin typeface="Menlo" charset="0"/>
-                <a:ea typeface="Menlo" charset="0"/>
-                <a:cs typeface="Menlo" charset="0"/>
-              </a:rPr>
-              <a:t> *state);</a:t>
-            </a:r>
-          </a:p>
-          <a:p>
-            <a:pPr marL="0" indent="0">
-              <a:buNone/>
-            </a:pPr>
-            <a:endParaRPr lang="en-US" dirty="0" smtClean="0">
-              <a:latin typeface="Menlo" charset="0"/>
-              <a:ea typeface="Menlo" charset="0"/>
-              <a:cs typeface="Menlo" charset="0"/>
-            </a:endParaRPr>
-          </a:p>
-          <a:p>
-            <a:r>
-              <a:rPr lang="en-US" dirty="0" smtClean="0">
-                <a:latin typeface="Menlo" charset="0"/>
-                <a:ea typeface="Menlo" charset="0"/>
-                <a:cs typeface="Menlo" charset="0"/>
-              </a:rPr>
-              <a:t>state</a:t>
-            </a:r>
+          <a:bodyPr/>
+          <a:lstStyle/>
+          <a:p>
             <a:r>
               <a:rPr lang="en-US" dirty="0" smtClean="0"/>
-              <a:t> is a well-defined (enumerated) list of constants to describe the state of the entire library.</a:t>
+              <a:t>Embed a catastrophic in the error code</a:t>
             </a:r>
           </a:p>
           <a:p>
             <a:pPr lvl="1"/>
             <a:r>
-              <a:rPr lang="en-US" dirty="0" smtClean="0">
-                <a:latin typeface="Menlo" charset="0"/>
-                <a:ea typeface="Menlo" charset="0"/>
-                <a:cs typeface="Menlo" charset="0"/>
-              </a:rPr>
-              <a:t>MPI_IS_OK</a:t>
+              <a:rPr lang="en-US" dirty="0" smtClean="0"/>
+              <a:t>It doesn’t help with thread safety (because thread safety doesn’t apply if the library is catastrophic)</a:t>
             </a:r>
           </a:p>
           <a:p>
             <a:pPr lvl="1"/>
             <a:r>
-              <a:rPr lang="en-US" dirty="0" smtClean="0">
-                <a:latin typeface="Menlo" charset="0"/>
-                <a:ea typeface="Menlo" charset="0"/>
-                <a:cs typeface="Menlo" charset="0"/>
-              </a:rPr>
-              <a:t>MPI_IS_CATASTROPHIC</a:t>
-            </a:r>
-          </a:p>
-          <a:p>
-            <a:r>
               <a:rPr lang="en-US" dirty="0" smtClean="0"/>
-              <a:t>Tweak the wording about MPI being undefined after errors to say that it’s only undefined after catastrophic errors.</a:t>
-            </a:r>
-            <a:endParaRPr lang="en-US" dirty="0"/>
+              <a:t>You might have an error that occurs in somewhere that doesn’t have an error code (e.g. another thread, “completed” send, incoming fragment causes error)</a:t>
+            </a:r>
           </a:p>
           <a:p>
             <a:r>
               <a:rPr lang="en-US" dirty="0" smtClean="0"/>
-              <a:t>You can read the issue </a:t>
-            </a:r>
-            <a:r>
-              <a:rPr lang="en-US" dirty="0" smtClean="0">
-                <a:hlinkClick r:id="rId2"/>
-              </a:rPr>
-              <a:t>mpi-forum/mpi-issues#28</a:t>
-            </a:r>
+              <a:t>Have catastrophic classes and non-catastrophic classes</a:t>
+            </a:r>
+          </a:p>
+          <a:p>
+            <a:pPr lvl="1"/>
             <a:r>
               <a:rPr lang="en-US" dirty="0" smtClean="0"/>
-              <a:t> and pull request </a:t>
-            </a:r>
-            <a:r>
-              <a:rPr lang="en-US" dirty="0" smtClean="0">
-                <a:hlinkClick r:id="rId3"/>
-              </a:rPr>
-              <a:t>mpi-forum/mpi-standard#9</a:t>
-            </a:r>
+              <a:t>Some errors might be catastrophic at times and non-catastrophic at other times</a:t>
+            </a:r>
+          </a:p>
+          <a:p>
+            <a:pPr lvl="1"/>
             <a:r>
               <a:rPr lang="en-US" dirty="0" smtClean="0"/>
-              <a:t>.</a:t>
-            </a:r>
-          </a:p>
-          <a:p>
-            <a:pPr lvl="1"/>
+              <a:t>Also, it’s harder to determine programmatically</a:t>
+            </a:r>
             <a:endParaRPr lang="en-US" dirty="0"/>
           </a:p>
         </p:txBody>
@@ -6426,20 +6440,13 @@
     </p:spTree>
     <p:extLst>
       <p:ext uri="{BB962C8B-B14F-4D97-AF65-F5344CB8AC3E}">
-        <p14:creationId xmlns:p14="http://schemas.microsoft.com/office/powerpoint/2010/main" val="1479762370"/>
+        <p14:creationId xmlns:p14="http://schemas.microsoft.com/office/powerpoint/2010/main" val="1557670211"/>
       </p:ext>
     </p:extLst>
   </p:cSld>
   <p:clrMapOvr>
     <a:masterClrMapping/>
   </p:clrMapOvr>
-  <p:timing>
-    <p:tnLst>
-      <p:par>
-        <p:cTn id="1" dur="indefinite" restart="never" nodeType="tmRoot"/>
-      </p:par>
-    </p:tnLst>
-  </p:timing>
 </p:sld>
 </file>
 
@@ -6526,8 +6533,20 @@
             </a:r>
             <a:r>
               <a:rPr lang="en-US" dirty="0"/>
-              <a:t> and after finalize.</a:t>
-            </a:r>
+              <a:t> and after finalize</a:t>
+            </a:r>
+            <a:r>
+              <a:rPr lang="en-US" dirty="0" smtClean="0"/>
+              <a:t>.</a:t>
+            </a:r>
+          </a:p>
+          <a:p>
+            <a:pPr lvl="1"/>
+            <a:r>
+              <a:rPr lang="en-US" dirty="0" smtClean="0"/>
+              <a:t>Is this really necessary? It doesn’t help detect errors with FINALIZE and is useless for before INIT.</a:t>
+            </a:r>
+            <a:endParaRPr lang="en-US" dirty="0"/>
           </a:p>
         </p:txBody>
       </p:sp>

</xml_diff>